<commit_message>
major edits to crypto full course
</commit_message>
<xml_diff>
--- a/6.Crypto/1.Full Course/2.ClassicCiphers/Cryptology2-Classic-Ciphers.pptx
+++ b/6.Crypto/1.Full Course/2.ClassicCiphers/Cryptology2-Classic-Ciphers.pptx
@@ -5,7 +5,7 @@
     <p:sldMasterId id="2147483648" r:id="rId1"/>
   </p:sldMasterIdLst>
   <p:notesMasterIdLst>
-    <p:notesMasterId r:id="rId12"/>
+    <p:notesMasterId r:id="rId13"/>
   </p:notesMasterIdLst>
   <p:sldIdLst>
     <p:sldId id="256" r:id="rId2"/>
@@ -18,6 +18,7 @@
     <p:sldId id="274" r:id="rId9"/>
     <p:sldId id="270" r:id="rId10"/>
     <p:sldId id="277" r:id="rId11"/>
+    <p:sldId id="278" r:id="rId12"/>
   </p:sldIdLst>
   <p:sldSz cx="12192000" cy="6858000"/>
   <p:notesSz cx="6858000" cy="9144000"/>
@@ -209,7 +210,7 @@
           <a:p>
             <a:fld id="{5E632E0F-5501-4F2B-B5AE-AC9FF1DEB234}" type="datetimeFigureOut">
               <a:rPr lang="en-US" smtClean="0"/>
-              <a:t>2/1/2023</a:t>
+              <a:t>2/7/2024</a:t>
             </a:fld>
             <a:endParaRPr lang="en-US"/>
           </a:p>
@@ -1723,7 +1724,7 @@
           <a:p>
             <a:fld id="{1E435803-0E45-435F-A285-8660CEC62D1A}" type="datetimeFigureOut">
               <a:rPr lang="en-US" smtClean="0"/>
-              <a:t>2/1/2023</a:t>
+              <a:t>2/7/2024</a:t>
             </a:fld>
             <a:endParaRPr lang="en-US"/>
           </a:p>
@@ -1921,7 +1922,7 @@
           <a:p>
             <a:fld id="{1E435803-0E45-435F-A285-8660CEC62D1A}" type="datetimeFigureOut">
               <a:rPr lang="en-US" smtClean="0"/>
-              <a:t>2/1/2023</a:t>
+              <a:t>2/7/2024</a:t>
             </a:fld>
             <a:endParaRPr lang="en-US"/>
           </a:p>
@@ -2129,7 +2130,7 @@
           <a:p>
             <a:fld id="{1E435803-0E45-435F-A285-8660CEC62D1A}" type="datetimeFigureOut">
               <a:rPr lang="en-US" smtClean="0"/>
-              <a:t>2/1/2023</a:t>
+              <a:t>2/7/2024</a:t>
             </a:fld>
             <a:endParaRPr lang="en-US"/>
           </a:p>
@@ -2327,7 +2328,7 @@
           <a:p>
             <a:fld id="{1E435803-0E45-435F-A285-8660CEC62D1A}" type="datetimeFigureOut">
               <a:rPr lang="en-US" smtClean="0"/>
-              <a:t>2/1/2023</a:t>
+              <a:t>2/7/2024</a:t>
             </a:fld>
             <a:endParaRPr lang="en-US"/>
           </a:p>
@@ -2602,7 +2603,7 @@
           <a:p>
             <a:fld id="{1E435803-0E45-435F-A285-8660CEC62D1A}" type="datetimeFigureOut">
               <a:rPr lang="en-US" smtClean="0"/>
-              <a:t>2/1/2023</a:t>
+              <a:t>2/7/2024</a:t>
             </a:fld>
             <a:endParaRPr lang="en-US"/>
           </a:p>
@@ -2867,7 +2868,7 @@
           <a:p>
             <a:fld id="{1E435803-0E45-435F-A285-8660CEC62D1A}" type="datetimeFigureOut">
               <a:rPr lang="en-US" smtClean="0"/>
-              <a:t>2/1/2023</a:t>
+              <a:t>2/7/2024</a:t>
             </a:fld>
             <a:endParaRPr lang="en-US"/>
           </a:p>
@@ -3279,7 +3280,7 @@
           <a:p>
             <a:fld id="{1E435803-0E45-435F-A285-8660CEC62D1A}" type="datetimeFigureOut">
               <a:rPr lang="en-US" smtClean="0"/>
-              <a:t>2/1/2023</a:t>
+              <a:t>2/7/2024</a:t>
             </a:fld>
             <a:endParaRPr lang="en-US"/>
           </a:p>
@@ -3420,7 +3421,7 @@
           <a:p>
             <a:fld id="{1E435803-0E45-435F-A285-8660CEC62D1A}" type="datetimeFigureOut">
               <a:rPr lang="en-US" smtClean="0"/>
-              <a:t>2/1/2023</a:t>
+              <a:t>2/7/2024</a:t>
             </a:fld>
             <a:endParaRPr lang="en-US"/>
           </a:p>
@@ -3533,7 +3534,7 @@
           <a:p>
             <a:fld id="{1E435803-0E45-435F-A285-8660CEC62D1A}" type="datetimeFigureOut">
               <a:rPr lang="en-US" smtClean="0"/>
-              <a:t>2/1/2023</a:t>
+              <a:t>2/7/2024</a:t>
             </a:fld>
             <a:endParaRPr lang="en-US"/>
           </a:p>
@@ -3844,7 +3845,7 @@
           <a:p>
             <a:fld id="{1E435803-0E45-435F-A285-8660CEC62D1A}" type="datetimeFigureOut">
               <a:rPr lang="en-US" smtClean="0"/>
-              <a:t>2/1/2023</a:t>
+              <a:t>2/7/2024</a:t>
             </a:fld>
             <a:endParaRPr lang="en-US"/>
           </a:p>
@@ -4132,7 +4133,7 @@
           <a:p>
             <a:fld id="{1E435803-0E45-435F-A285-8660CEC62D1A}" type="datetimeFigureOut">
               <a:rPr lang="en-US" smtClean="0"/>
-              <a:t>2/1/2023</a:t>
+              <a:t>2/7/2024</a:t>
             </a:fld>
             <a:endParaRPr lang="en-US"/>
           </a:p>
@@ -4373,7 +4374,7 @@
           <a:p>
             <a:fld id="{1E435803-0E45-435F-A285-8660CEC62D1A}" type="datetimeFigureOut">
               <a:rPr lang="en-US" smtClean="0"/>
-              <a:t>2/1/2023</a:t>
+              <a:t>2/7/2024</a:t>
             </a:fld>
             <a:endParaRPr lang="en-US"/>
           </a:p>
@@ -5258,6 +5259,185 @@
     <p:extLst>
       <p:ext uri="{BB962C8B-B14F-4D97-AF65-F5344CB8AC3E}">
         <p14:creationId xmlns:p14="http://schemas.microsoft.com/office/powerpoint/2010/main" val="300292225"/>
+      </p:ext>
+    </p:extLst>
+  </p:cSld>
+  <p:clrMapOvr>
+    <a:masterClrMapping/>
+  </p:clrMapOvr>
+</p:sld>
+</file>
+
+<file path=ppt/slides/slide11.xml><?xml version="1.0" encoding="utf-8"?>
+<p:sld xmlns:a="http://schemas.openxmlformats.org/drawingml/2006/main" xmlns:r="http://schemas.openxmlformats.org/officeDocument/2006/relationships" xmlns:p="http://schemas.openxmlformats.org/presentationml/2006/main">
+  <p:cSld>
+    <p:spTree>
+      <p:nvGrpSpPr>
+        <p:cNvPr id="1" name=""/>
+        <p:cNvGrpSpPr/>
+        <p:nvPr/>
+      </p:nvGrpSpPr>
+      <p:grpSpPr>
+        <a:xfrm>
+          <a:off x="0" y="0"/>
+          <a:ext cx="0" cy="0"/>
+          <a:chOff x="0" y="0"/>
+          <a:chExt cx="0" cy="0"/>
+        </a:xfrm>
+      </p:grpSpPr>
+      <p:sp>
+        <p:nvSpPr>
+          <p:cNvPr id="2" name="Title 1">
+            <a:extLst>
+              <a:ext uri="{FF2B5EF4-FFF2-40B4-BE49-F238E27FC236}">
+                <a16:creationId xmlns:a16="http://schemas.microsoft.com/office/drawing/2014/main" id="{48C90DA7-57D0-5414-88AF-D8F3216A4134}"/>
+              </a:ext>
+            </a:extLst>
+          </p:cNvPr>
+          <p:cNvSpPr>
+            <a:spLocks noGrp="1"/>
+          </p:cNvSpPr>
+          <p:nvPr>
+            <p:ph type="title"/>
+          </p:nvPr>
+        </p:nvSpPr>
+        <p:spPr/>
+        <p:txBody>
+          <a:bodyPr/>
+          <a:lstStyle/>
+          <a:p>
+            <a:r>
+              <a:rPr lang="en-US" dirty="0"/>
+              <a:t>Some links for decoding classic ciphers</a:t>
+            </a:r>
+            <a:br>
+              <a:rPr lang="en-US" dirty="0"/>
+            </a:br>
+            <a:r>
+              <a:rPr lang="en-US" dirty="0"/>
+              <a:t>(Handy for CTFs)</a:t>
+            </a:r>
+          </a:p>
+        </p:txBody>
+      </p:sp>
+      <p:sp>
+        <p:nvSpPr>
+          <p:cNvPr id="3" name="Content Placeholder 2">
+            <a:extLst>
+              <a:ext uri="{FF2B5EF4-FFF2-40B4-BE49-F238E27FC236}">
+                <a16:creationId xmlns:a16="http://schemas.microsoft.com/office/drawing/2014/main" id="{B59DE717-2519-32CD-D720-017CCEB42186}"/>
+              </a:ext>
+            </a:extLst>
+          </p:cNvPr>
+          <p:cNvSpPr>
+            <a:spLocks noGrp="1"/>
+          </p:cNvSpPr>
+          <p:nvPr>
+            <p:ph idx="1"/>
+          </p:nvPr>
+        </p:nvSpPr>
+        <p:spPr/>
+        <p:txBody>
+          <a:bodyPr/>
+          <a:lstStyle/>
+          <a:p>
+            <a:r>
+              <a:rPr lang="en-US" dirty="0"/>
+              <a:t>CyberChef </a:t>
+            </a:r>
+            <a:r>
+              <a:rPr lang="en-US" dirty="0">
+                <a:hlinkClick r:id="rId2"/>
+              </a:rPr>
+              <a:t>https://gchq.github.io/CyberChef/</a:t>
+            </a:r>
+            <a:endParaRPr lang="en-US" dirty="0"/>
+          </a:p>
+          <a:p>
+            <a:r>
+              <a:rPr lang="en-US" dirty="0"/>
+              <a:t>dCode.fr </a:t>
+            </a:r>
+            <a:r>
+              <a:rPr lang="en-US" dirty="0">
+                <a:hlinkClick r:id="rId3"/>
+              </a:rPr>
+              <a:t>https://www.dcode.fr/en</a:t>
+            </a:r>
+            <a:endParaRPr lang="en-US" dirty="0"/>
+          </a:p>
+          <a:p>
+            <a:r>
+              <a:rPr lang="en-US" dirty="0" err="1"/>
+              <a:t>Boxentriq</a:t>
+            </a:r>
+            <a:r>
+              <a:rPr lang="en-US" dirty="0"/>
+              <a:t>	</a:t>
+            </a:r>
+            <a:r>
+              <a:rPr lang="en-US" dirty="0">
+                <a:hlinkClick r:id="rId4"/>
+              </a:rPr>
+              <a:t>https://www.boxentriq.com/</a:t>
+            </a:r>
+            <a:endParaRPr lang="en-US" dirty="0"/>
+          </a:p>
+          <a:p>
+            <a:r>
+              <a:rPr lang="en-US" dirty="0" err="1"/>
+              <a:t>CrypTool</a:t>
+            </a:r>
+            <a:r>
+              <a:rPr lang="en-US" dirty="0"/>
+              <a:t> </a:t>
+            </a:r>
+            <a:r>
+              <a:rPr lang="en-US" dirty="0">
+                <a:hlinkClick r:id="rId5"/>
+              </a:rPr>
+              <a:t>https://www.cryptool.org/en/cto/</a:t>
+            </a:r>
+            <a:endParaRPr lang="en-US" dirty="0"/>
+          </a:p>
+          <a:p>
+            <a:r>
+              <a:rPr lang="en-US" dirty="0"/>
+              <a:t>Steganography </a:t>
+            </a:r>
+            <a:r>
+              <a:rPr lang="en-US" dirty="0">
+                <a:hlinkClick r:id="rId6"/>
+              </a:rPr>
+              <a:t>https://infosecwriteups.com/some-common-steganography-tools-for-ctfs-92e3de93f141</a:t>
+            </a:r>
+            <a:endParaRPr lang="en-US" dirty="0"/>
+          </a:p>
+          <a:p>
+            <a:r>
+              <a:rPr lang="en-US"/>
+              <a:t>Steganography </a:t>
+            </a:r>
+            <a:r>
+              <a:rPr lang="en-US" dirty="0">
+                <a:hlinkClick r:id="rId7"/>
+              </a:rPr>
+              <a:t>https://blackarch.org/stego.html</a:t>
+            </a:r>
+            <a:r>
+              <a:rPr lang="en-US" dirty="0"/>
+              <a:t> </a:t>
+            </a:r>
+          </a:p>
+          <a:p>
+            <a:endParaRPr lang="en-US" dirty="0"/>
+          </a:p>
+        </p:txBody>
+      </p:sp>
+    </p:spTree>
+    <p:extLst>
+      <p:ext uri="{BB962C8B-B14F-4D97-AF65-F5344CB8AC3E}">
+        <p14:creationId xmlns:p14="http://schemas.microsoft.com/office/powerpoint/2010/main" val="2869708019"/>
       </p:ext>
     </p:extLst>
   </p:cSld>

</xml_diff>